<commit_message>
Added While loops 2
</commit_message>
<xml_diff>
--- a/3 Ciclos.pptx
+++ b/3 Ciclos.pptx
@@ -299,6 +299,30 @@
 
 <file path=ppt/changesInfos/changesInfo1.xml><?xml version="1.0" encoding="utf-8"?>
 <pc:chgInfo xmlns:a="http://schemas.openxmlformats.org/drawingml/2006/main" xmlns:r="http://schemas.openxmlformats.org/officeDocument/2006/relationships" xmlns:ac="http://schemas.microsoft.com/office/drawing/2013/main/command" xmlns:pc="http://schemas.microsoft.com/office/powerpoint/2013/main/command">
+  <pc:docChgLst>
+    <pc:chgData name="Rolando Rojas Sanfuentes (Alumno)" userId="2c56a9b6-e5a8-48f6-bb7c-ce0866612bbb" providerId="ADAL" clId="{2F7E5962-82D5-434E-8B65-F4429D5D801E}"/>
+    <pc:docChg chg="modSld">
+      <pc:chgData name="Rolando Rojas Sanfuentes (Alumno)" userId="2c56a9b6-e5a8-48f6-bb7c-ce0866612bbb" providerId="ADAL" clId="{2F7E5962-82D5-434E-8B65-F4429D5D801E}" dt="2023-08-16T15:41:33.820" v="32" actId="20577"/>
+      <pc:docMkLst>
+        <pc:docMk/>
+      </pc:docMkLst>
+      <pc:sldChg chg="modSp mod">
+        <pc:chgData name="Rolando Rojas Sanfuentes (Alumno)" userId="2c56a9b6-e5a8-48f6-bb7c-ce0866612bbb" providerId="ADAL" clId="{2F7E5962-82D5-434E-8B65-F4429D5D801E}" dt="2023-08-16T15:41:33.820" v="32" actId="20577"/>
+        <pc:sldMkLst>
+          <pc:docMk/>
+          <pc:sldMk cId="1038476432" sldId="311"/>
+        </pc:sldMkLst>
+        <pc:spChg chg="mod">
+          <ac:chgData name="Rolando Rojas Sanfuentes (Alumno)" userId="2c56a9b6-e5a8-48f6-bb7c-ce0866612bbb" providerId="ADAL" clId="{2F7E5962-82D5-434E-8B65-F4429D5D801E}" dt="2023-08-16T15:41:33.820" v="32" actId="20577"/>
+          <ac:spMkLst>
+            <pc:docMk/>
+            <pc:sldMk cId="1038476432" sldId="311"/>
+            <ac:spMk id="297" creationId="{00000000-0000-0000-0000-000000000000}"/>
+          </ac:spMkLst>
+        </pc:spChg>
+      </pc:sldChg>
+    </pc:docChg>
+  </pc:docChgLst>
   <pc:docChgLst>
     <pc:chgData name="Rolando Rojas Sanfuentes (Alumno)" userId="2c56a9b6-e5a8-48f6-bb7c-ce0866612bbb" providerId="ADAL" clId="{C8221349-21DB-418E-9579-CE3FB8546D4A}"/>
     <pc:docChg chg="undo redo custSel addSld delSld modSld sldOrd delMainMaster">
@@ -15710,7 +15734,96 @@
               <a:rPr lang="es-MX" sz="1800" i="1" dirty="0"/>
               <a:t> anidados para separar los dígitos y realizar el conteo.</a:t>
             </a:r>
-            <a:endParaRPr lang="es-CL" sz="1800" i="1" dirty="0"/>
+          </a:p>
+          <a:p>
+            <a:pPr marL="0" lvl="0" indent="0" algn="l" rtl="0">
+              <a:spcBef>
+                <a:spcPts val="0"/>
+              </a:spcBef>
+              <a:spcAft>
+                <a:spcPts val="0"/>
+              </a:spcAft>
+              <a:buNone/>
+            </a:pPr>
+            <a:endParaRPr lang="es-MX" sz="1800" i="1" dirty="0"/>
+          </a:p>
+          <a:p>
+            <a:pPr marL="0" lvl="0" indent="0" algn="l" rtl="0">
+              <a:spcBef>
+                <a:spcPts val="0"/>
+              </a:spcBef>
+              <a:spcAft>
+                <a:spcPts val="0"/>
+              </a:spcAft>
+              <a:buNone/>
+            </a:pPr>
+            <a:r>
+              <a:rPr lang="es-MX" sz="1800" i="1">
+                <a:solidFill>
+                  <a:schemeClr val="tx2">
+                    <a:lumMod val="75000"/>
+                  </a:schemeClr>
+                </a:solidFill>
+              </a:rPr>
+              <a:t>*</a:t>
+            </a:r>
+            <a:r>
+              <a:rPr lang="es-MX" sz="1800" i="1" dirty="0">
+                <a:solidFill>
+                  <a:schemeClr val="tx2">
+                    <a:lumMod val="75000"/>
+                  </a:schemeClr>
+                </a:solidFill>
+              </a:rPr>
+              <a:t>T</a:t>
+            </a:r>
+            <a:r>
+              <a:rPr lang="es-MX" sz="1800" i="1">
+                <a:solidFill>
+                  <a:schemeClr val="tx2">
+                    <a:lumMod val="75000"/>
+                  </a:schemeClr>
+                </a:solidFill>
+              </a:rPr>
+              <a:t>ip</a:t>
+            </a:r>
+            <a:r>
+              <a:rPr lang="es-MX" sz="1800" i="1" dirty="0">
+                <a:solidFill>
+                  <a:schemeClr val="tx2">
+                    <a:lumMod val="75000"/>
+                  </a:schemeClr>
+                </a:solidFill>
+              </a:rPr>
+              <a:t>: puedes ocupar </a:t>
+            </a:r>
+            <a:r>
+              <a:rPr lang="es-MX" sz="1800" i="1" dirty="0" err="1">
+                <a:solidFill>
+                  <a:schemeClr val="tx2">
+                    <a:lumMod val="75000"/>
+                  </a:schemeClr>
+                </a:solidFill>
+              </a:rPr>
+              <a:t>strings</a:t>
+            </a:r>
+            <a:r>
+              <a:rPr lang="es-MX" sz="1800" i="1" dirty="0">
+                <a:solidFill>
+                  <a:schemeClr val="tx2">
+                    <a:lumMod val="75000"/>
+                  </a:schemeClr>
+                </a:solidFill>
+              </a:rPr>
+              <a:t>!</a:t>
+            </a:r>
+            <a:endParaRPr lang="es-CL" sz="1800" i="1" dirty="0">
+              <a:solidFill>
+                <a:schemeClr val="tx2">
+                  <a:lumMod val="75000"/>
+                </a:schemeClr>
+              </a:solidFill>
+            </a:endParaRPr>
           </a:p>
         </p:txBody>
       </p:sp>

</xml_diff>